<commit_message>
changed the Proposed Activities.
</commit_message>
<xml_diff>
--- a/Presentations/Digital Synesthesia Scenarios.pptx
+++ b/Presentations/Digital Synesthesia Scenarios.pptx
@@ -13,6 +13,10 @@
     <p:sldId id="259" r:id="rId7"/>
     <p:sldId id="261" r:id="rId8"/>
     <p:sldId id="263" r:id="rId9"/>
+    <p:sldId id="264" r:id="rId10"/>
+    <p:sldId id="265" r:id="rId11"/>
+    <p:sldId id="266" r:id="rId12"/>
+    <p:sldId id="267" r:id="rId13"/>
   </p:sldIdLst>
   <p:sldSz cx="9144000" cy="6858000" type="screen4x3"/>
   <p:notesSz cx="6858000" cy="9144000"/>
@@ -295,7 +299,7 @@
           <a:p>
             <a:fld id="{3C116D94-F86E-41D3-874A-BEBDAB653ACF}" type="datetimeFigureOut">
               <a:rPr lang="en-US" smtClean="0"/>
-              <a:t>9/12/2013</a:t>
+              <a:t>9/13/2013</a:t>
             </a:fld>
             <a:endParaRPr lang="en-US"/>
           </a:p>
@@ -465,7 +469,7 @@
           <a:p>
             <a:fld id="{3C116D94-F86E-41D3-874A-BEBDAB653ACF}" type="datetimeFigureOut">
               <a:rPr lang="en-US" smtClean="0"/>
-              <a:t>9/12/2013</a:t>
+              <a:t>9/13/2013</a:t>
             </a:fld>
             <a:endParaRPr lang="en-US"/>
           </a:p>
@@ -645,7 +649,7 @@
           <a:p>
             <a:fld id="{3C116D94-F86E-41D3-874A-BEBDAB653ACF}" type="datetimeFigureOut">
               <a:rPr lang="en-US" smtClean="0"/>
-              <a:t>9/12/2013</a:t>
+              <a:t>9/13/2013</a:t>
             </a:fld>
             <a:endParaRPr lang="en-US"/>
           </a:p>
@@ -815,7 +819,7 @@
           <a:p>
             <a:fld id="{3C116D94-F86E-41D3-874A-BEBDAB653ACF}" type="datetimeFigureOut">
               <a:rPr lang="en-US" smtClean="0"/>
-              <a:t>9/12/2013</a:t>
+              <a:t>9/13/2013</a:t>
             </a:fld>
             <a:endParaRPr lang="en-US"/>
           </a:p>
@@ -1061,7 +1065,7 @@
           <a:p>
             <a:fld id="{3C116D94-F86E-41D3-874A-BEBDAB653ACF}" type="datetimeFigureOut">
               <a:rPr lang="en-US" smtClean="0"/>
-              <a:t>9/12/2013</a:t>
+              <a:t>9/13/2013</a:t>
             </a:fld>
             <a:endParaRPr lang="en-US"/>
           </a:p>
@@ -1349,7 +1353,7 @@
           <a:p>
             <a:fld id="{3C116D94-F86E-41D3-874A-BEBDAB653ACF}" type="datetimeFigureOut">
               <a:rPr lang="en-US" smtClean="0"/>
-              <a:t>9/12/2013</a:t>
+              <a:t>9/13/2013</a:t>
             </a:fld>
             <a:endParaRPr lang="en-US"/>
           </a:p>
@@ -1771,7 +1775,7 @@
           <a:p>
             <a:fld id="{3C116D94-F86E-41D3-874A-BEBDAB653ACF}" type="datetimeFigureOut">
               <a:rPr lang="en-US" smtClean="0"/>
-              <a:t>9/12/2013</a:t>
+              <a:t>9/13/2013</a:t>
             </a:fld>
             <a:endParaRPr lang="en-US"/>
           </a:p>
@@ -1889,7 +1893,7 @@
           <a:p>
             <a:fld id="{3C116D94-F86E-41D3-874A-BEBDAB653ACF}" type="datetimeFigureOut">
               <a:rPr lang="en-US" smtClean="0"/>
-              <a:t>9/12/2013</a:t>
+              <a:t>9/13/2013</a:t>
             </a:fld>
             <a:endParaRPr lang="en-US"/>
           </a:p>
@@ -1984,7 +1988,7 @@
           <a:p>
             <a:fld id="{3C116D94-F86E-41D3-874A-BEBDAB653ACF}" type="datetimeFigureOut">
               <a:rPr lang="en-US" smtClean="0"/>
-              <a:t>9/12/2013</a:t>
+              <a:t>9/13/2013</a:t>
             </a:fld>
             <a:endParaRPr lang="en-US"/>
           </a:p>
@@ -2261,7 +2265,7 @@
           <a:p>
             <a:fld id="{3C116D94-F86E-41D3-874A-BEBDAB653ACF}" type="datetimeFigureOut">
               <a:rPr lang="en-US" smtClean="0"/>
-              <a:t>9/12/2013</a:t>
+              <a:t>9/13/2013</a:t>
             </a:fld>
             <a:endParaRPr lang="en-US"/>
           </a:p>
@@ -2514,7 +2518,7 @@
           <a:p>
             <a:fld id="{3C116D94-F86E-41D3-874A-BEBDAB653ACF}" type="datetimeFigureOut">
               <a:rPr lang="en-US" smtClean="0"/>
-              <a:t>9/12/2013</a:t>
+              <a:t>9/13/2013</a:t>
             </a:fld>
             <a:endParaRPr lang="en-US"/>
           </a:p>
@@ -2727,7 +2731,7 @@
           <a:p>
             <a:fld id="{3C116D94-F86E-41D3-874A-BEBDAB653ACF}" type="datetimeFigureOut">
               <a:rPr lang="en-US" smtClean="0"/>
-              <a:t>9/12/2013</a:t>
+              <a:t>9/13/2013</a:t>
             </a:fld>
             <a:endParaRPr lang="en-US"/>
           </a:p>
@@ -3157,6 +3161,270 @@
 </p:sld>
 </file>
 
+<file path=ppt/slides/slide10.xml><?xml version="1.0" encoding="utf-8"?>
+<p:sld xmlns:a="http://schemas.openxmlformats.org/drawingml/2006/main" xmlns:r="http://schemas.openxmlformats.org/officeDocument/2006/relationships" xmlns:p="http://schemas.openxmlformats.org/presentationml/2006/main">
+  <p:cSld>
+    <p:spTree>
+      <p:nvGrpSpPr>
+        <p:cNvPr id="1" name=""/>
+        <p:cNvGrpSpPr/>
+        <p:nvPr/>
+      </p:nvGrpSpPr>
+      <p:grpSpPr>
+        <a:xfrm>
+          <a:off x="0" y="0"/>
+          <a:ext cx="0" cy="0"/>
+          <a:chOff x="0" y="0"/>
+          <a:chExt cx="0" cy="0"/>
+        </a:xfrm>
+      </p:grpSpPr>
+      <p:sp>
+        <p:nvSpPr>
+          <p:cNvPr id="2" name="Title 1"/>
+          <p:cNvSpPr>
+            <a:spLocks noGrp="1"/>
+          </p:cNvSpPr>
+          <p:nvPr>
+            <p:ph type="title"/>
+          </p:nvPr>
+        </p:nvSpPr>
+        <p:spPr/>
+        <p:txBody>
+          <a:bodyPr/>
+          <a:lstStyle/>
+          <a:p>
+            <a:r>
+              <a:rPr lang="en-US" dirty="0" smtClean="0"/>
+              <a:t>Remote Camera</a:t>
+            </a:r>
+            <a:endParaRPr lang="en-US" dirty="0"/>
+          </a:p>
+        </p:txBody>
+      </p:sp>
+      <p:sp>
+        <p:nvSpPr>
+          <p:cNvPr id="3" name="Content Placeholder 2"/>
+          <p:cNvSpPr>
+            <a:spLocks noGrp="1"/>
+          </p:cNvSpPr>
+          <p:nvPr>
+            <p:ph idx="1"/>
+          </p:nvPr>
+        </p:nvSpPr>
+        <p:spPr/>
+        <p:txBody>
+          <a:bodyPr/>
+          <a:lstStyle/>
+          <a:p>
+            <a:pPr marL="0" indent="0">
+              <a:buNone/>
+            </a:pPr>
+            <a:r>
+              <a:rPr lang="en-US" dirty="0" smtClean="0"/>
+              <a:t>Baby movement</a:t>
+            </a:r>
+          </a:p>
+          <a:p>
+            <a:pPr marL="0" indent="0">
+              <a:buNone/>
+            </a:pPr>
+            <a:r>
+              <a:rPr lang="en-US" dirty="0" smtClean="0"/>
+              <a:t>Patient breathing pattern</a:t>
+            </a:r>
+            <a:endParaRPr lang="en-US" dirty="0"/>
+          </a:p>
+        </p:txBody>
+      </p:sp>
+    </p:spTree>
+    <p:extLst>
+      <p:ext uri="{BB962C8B-B14F-4D97-AF65-F5344CB8AC3E}">
+        <p14:creationId xmlns:p14="http://schemas.microsoft.com/office/powerpoint/2010/main" val="2174503124"/>
+      </p:ext>
+    </p:extLst>
+  </p:cSld>
+  <p:clrMapOvr>
+    <a:masterClrMapping/>
+  </p:clrMapOvr>
+</p:sld>
+</file>
+
+<file path=ppt/slides/slide11.xml><?xml version="1.0" encoding="utf-8"?>
+<p:sld xmlns:a="http://schemas.openxmlformats.org/drawingml/2006/main" xmlns:r="http://schemas.openxmlformats.org/officeDocument/2006/relationships" xmlns:p="http://schemas.openxmlformats.org/presentationml/2006/main">
+  <p:cSld>
+    <p:spTree>
+      <p:nvGrpSpPr>
+        <p:cNvPr id="1" name=""/>
+        <p:cNvGrpSpPr/>
+        <p:nvPr/>
+      </p:nvGrpSpPr>
+      <p:grpSpPr>
+        <a:xfrm>
+          <a:off x="0" y="0"/>
+          <a:ext cx="0" cy="0"/>
+          <a:chOff x="0" y="0"/>
+          <a:chExt cx="0" cy="0"/>
+        </a:xfrm>
+      </p:grpSpPr>
+      <p:sp>
+        <p:nvSpPr>
+          <p:cNvPr id="2" name="Title 1"/>
+          <p:cNvSpPr>
+            <a:spLocks noGrp="1"/>
+          </p:cNvSpPr>
+          <p:nvPr>
+            <p:ph type="title"/>
+          </p:nvPr>
+        </p:nvSpPr>
+        <p:spPr/>
+        <p:txBody>
+          <a:bodyPr/>
+          <a:lstStyle/>
+          <a:p>
+            <a:r>
+              <a:rPr lang="en-US" dirty="0" smtClean="0"/>
+              <a:t>TV Watching?</a:t>
+            </a:r>
+            <a:endParaRPr lang="en-US" dirty="0"/>
+          </a:p>
+        </p:txBody>
+      </p:sp>
+      <p:sp>
+        <p:nvSpPr>
+          <p:cNvPr id="3" name="Content Placeholder 2"/>
+          <p:cNvSpPr>
+            <a:spLocks noGrp="1"/>
+          </p:cNvSpPr>
+          <p:nvPr>
+            <p:ph idx="1"/>
+          </p:nvPr>
+        </p:nvSpPr>
+        <p:spPr/>
+        <p:txBody>
+          <a:bodyPr/>
+          <a:lstStyle/>
+          <a:p>
+            <a:pPr marL="0" indent="0">
+              <a:buNone/>
+            </a:pPr>
+            <a:r>
+              <a:rPr lang="en-US" dirty="0" smtClean="0"/>
+              <a:t>Second channel activity</a:t>
+            </a:r>
+          </a:p>
+          <a:p>
+            <a:pPr marL="0" indent="0">
+              <a:buNone/>
+            </a:pPr>
+            <a:r>
+              <a:rPr lang="en-US" dirty="0" smtClean="0"/>
+              <a:t>Remote friend watching at the same time</a:t>
+            </a:r>
+            <a:endParaRPr lang="en-US" dirty="0"/>
+          </a:p>
+        </p:txBody>
+      </p:sp>
+    </p:spTree>
+    <p:extLst>
+      <p:ext uri="{BB962C8B-B14F-4D97-AF65-F5344CB8AC3E}">
+        <p14:creationId xmlns:p14="http://schemas.microsoft.com/office/powerpoint/2010/main" val="3905417366"/>
+      </p:ext>
+    </p:extLst>
+  </p:cSld>
+  <p:clrMapOvr>
+    <a:masterClrMapping/>
+  </p:clrMapOvr>
+</p:sld>
+</file>
+
+<file path=ppt/slides/slide12.xml><?xml version="1.0" encoding="utf-8"?>
+<p:sld xmlns:a="http://schemas.openxmlformats.org/drawingml/2006/main" xmlns:r="http://schemas.openxmlformats.org/officeDocument/2006/relationships" xmlns:p="http://schemas.openxmlformats.org/presentationml/2006/main">
+  <p:cSld>
+    <p:spTree>
+      <p:nvGrpSpPr>
+        <p:cNvPr id="1" name=""/>
+        <p:cNvGrpSpPr/>
+        <p:nvPr/>
+      </p:nvGrpSpPr>
+      <p:grpSpPr>
+        <a:xfrm>
+          <a:off x="0" y="0"/>
+          <a:ext cx="0" cy="0"/>
+          <a:chOff x="0" y="0"/>
+          <a:chExt cx="0" cy="0"/>
+        </a:xfrm>
+      </p:grpSpPr>
+      <p:sp>
+        <p:nvSpPr>
+          <p:cNvPr id="2" name="Title 1"/>
+          <p:cNvSpPr>
+            <a:spLocks noGrp="1"/>
+          </p:cNvSpPr>
+          <p:nvPr>
+            <p:ph type="title"/>
+          </p:nvPr>
+        </p:nvSpPr>
+        <p:spPr/>
+        <p:txBody>
+          <a:bodyPr/>
+          <a:lstStyle/>
+          <a:p>
+            <a:r>
+              <a:rPr lang="en-US" dirty="0" smtClean="0"/>
+              <a:t>Environment Monitoring</a:t>
+            </a:r>
+            <a:endParaRPr lang="en-US" dirty="0"/>
+          </a:p>
+        </p:txBody>
+      </p:sp>
+      <p:sp>
+        <p:nvSpPr>
+          <p:cNvPr id="3" name="Content Placeholder 2"/>
+          <p:cNvSpPr>
+            <a:spLocks noGrp="1"/>
+          </p:cNvSpPr>
+          <p:nvPr>
+            <p:ph idx="1"/>
+          </p:nvPr>
+        </p:nvSpPr>
+        <p:spPr/>
+        <p:txBody>
+          <a:bodyPr/>
+          <a:lstStyle/>
+          <a:p>
+            <a:pPr marL="0" indent="0">
+              <a:buNone/>
+            </a:pPr>
+            <a:r>
+              <a:rPr lang="en-US" dirty="0" smtClean="0"/>
+              <a:t>Allergens</a:t>
+            </a:r>
+          </a:p>
+          <a:p>
+            <a:pPr marL="0" indent="0">
+              <a:buNone/>
+            </a:pPr>
+            <a:r>
+              <a:rPr lang="en-US" smtClean="0"/>
+              <a:t>Pollutants</a:t>
+            </a:r>
+            <a:endParaRPr lang="en-US" dirty="0"/>
+          </a:p>
+        </p:txBody>
+      </p:sp>
+    </p:spTree>
+    <p:extLst>
+      <p:ext uri="{BB962C8B-B14F-4D97-AF65-F5344CB8AC3E}">
+        <p14:creationId xmlns:p14="http://schemas.microsoft.com/office/powerpoint/2010/main" val="1617123269"/>
+      </p:ext>
+    </p:extLst>
+  </p:cSld>
+  <p:clrMapOvr>
+    <a:masterClrMapping/>
+  </p:clrMapOvr>
+</p:sld>
+</file>
+
 <file path=ppt/slides/slide2.xml><?xml version="1.0" encoding="utf-8"?>
 <p:sld xmlns:a="http://schemas.openxmlformats.org/drawingml/2006/main" xmlns:r="http://schemas.openxmlformats.org/officeDocument/2006/relationships" xmlns:p="http://schemas.openxmlformats.org/presentationml/2006/main">
   <p:cSld>
@@ -3235,11 +3503,11 @@
   <p:clrMapOvr>
     <a:masterClrMapping/>
   </p:clrMapOvr>
-  <mc:AlternateContent xmlns:mc="http://schemas.openxmlformats.org/markup-compatibility/2006">
-    <mc:Choice xmlns:p14="http://schemas.microsoft.com/office/powerpoint/2010/main" Requires="p14">
+  <mc:AlternateContent xmlns:mc="http://schemas.openxmlformats.org/markup-compatibility/2006" xmlns:p14="http://schemas.microsoft.com/office/powerpoint/2010/main">
+    <mc:Choice Requires="p14">
       <p:transition spd="slow" p14:dur="2000"/>
     </mc:Choice>
-    <mc:Fallback>
+    <mc:Fallback xmlns="">
       <p:transition spd="slow"/>
     </mc:Fallback>
   </mc:AlternateContent>
@@ -3602,11 +3870,7 @@
             </a:pPr>
             <a:r>
               <a:rPr lang="en-US" dirty="0" smtClean="0"/>
-              <a:t>Keep important health issues in check like insulin levels, blood pressure, etc</a:t>
-            </a:r>
-            <a:r>
-              <a:rPr lang="en-US" dirty="0" smtClean="0"/>
-              <a:t>.</a:t>
+              <a:t>Keep important health issues in check like insulin levels, blood pressure, etc.</a:t>
             </a:r>
           </a:p>
           <a:p>
@@ -3625,7 +3889,6 @@
               <a:rPr lang="en-US" dirty="0" smtClean="0"/>
               <a:t>checking pulse.</a:t>
             </a:r>
-            <a:endParaRPr lang="en-US" dirty="0" smtClean="0"/>
           </a:p>
         </p:txBody>
       </p:sp>
@@ -3820,6 +4083,85 @@
     <p:extLst>
       <p:ext uri="{BB962C8B-B14F-4D97-AF65-F5344CB8AC3E}">
         <p14:creationId xmlns:p14="http://schemas.microsoft.com/office/powerpoint/2010/main" val="3564432935"/>
+      </p:ext>
+    </p:extLst>
+  </p:cSld>
+  <p:clrMapOvr>
+    <a:masterClrMapping/>
+  </p:clrMapOvr>
+</p:sld>
+</file>
+
+<file path=ppt/slides/slide9.xml><?xml version="1.0" encoding="utf-8"?>
+<p:sld xmlns:a="http://schemas.openxmlformats.org/drawingml/2006/main" xmlns:r="http://schemas.openxmlformats.org/officeDocument/2006/relationships" xmlns:p="http://schemas.openxmlformats.org/presentationml/2006/main">
+  <p:cSld>
+    <p:spTree>
+      <p:nvGrpSpPr>
+        <p:cNvPr id="1" name=""/>
+        <p:cNvGrpSpPr/>
+        <p:nvPr/>
+      </p:nvGrpSpPr>
+      <p:grpSpPr>
+        <a:xfrm>
+          <a:off x="0" y="0"/>
+          <a:ext cx="0" cy="0"/>
+          <a:chOff x="0" y="0"/>
+          <a:chExt cx="0" cy="0"/>
+        </a:xfrm>
+      </p:grpSpPr>
+      <p:sp>
+        <p:nvSpPr>
+          <p:cNvPr id="2" name="Title 1"/>
+          <p:cNvSpPr>
+            <a:spLocks noGrp="1"/>
+          </p:cNvSpPr>
+          <p:nvPr>
+            <p:ph type="title"/>
+          </p:nvPr>
+        </p:nvSpPr>
+        <p:spPr/>
+        <p:txBody>
+          <a:bodyPr/>
+          <a:lstStyle/>
+          <a:p>
+            <a:r>
+              <a:rPr lang="en-US" dirty="0" smtClean="0"/>
+              <a:t>Multitasking</a:t>
+            </a:r>
+            <a:endParaRPr lang="en-US" dirty="0"/>
+          </a:p>
+        </p:txBody>
+      </p:sp>
+      <p:sp>
+        <p:nvSpPr>
+          <p:cNvPr id="3" name="Content Placeholder 2"/>
+          <p:cNvSpPr>
+            <a:spLocks noGrp="1"/>
+          </p:cNvSpPr>
+          <p:nvPr>
+            <p:ph idx="1"/>
+          </p:nvPr>
+        </p:nvSpPr>
+        <p:spPr/>
+        <p:txBody>
+          <a:bodyPr/>
+          <a:lstStyle/>
+          <a:p>
+            <a:pPr marL="0" indent="0">
+              <a:buNone/>
+            </a:pPr>
+            <a:r>
+              <a:rPr lang="en-US" dirty="0" smtClean="0"/>
+              <a:t>Normal mobile device use</a:t>
+            </a:r>
+            <a:endParaRPr lang="en-US" dirty="0"/>
+          </a:p>
+        </p:txBody>
+      </p:sp>
+    </p:spTree>
+    <p:extLst>
+      <p:ext uri="{BB962C8B-B14F-4D97-AF65-F5344CB8AC3E}">
+        <p14:creationId xmlns:p14="http://schemas.microsoft.com/office/powerpoint/2010/main" val="634880515"/>
       </p:ext>
     </p:extLst>
   </p:cSld>

</xml_diff>